<commit_message>
Wat dingen hernoemd voor consitentie
</commit_message>
<xml_diff>
--- a/scratch-leapmotion/instructions/Scratch-opdracht_Bongo.pptx
+++ b/scratch-leapmotion/instructions/Scratch-opdracht_Bongo.pptx
@@ -275,7 +275,7 @@
           <a:p>
             <a:fld id="{279E9EA6-BBB3-1E40-BFD1-2E852B6140C4}" type="slidenum">
               <a:rPr lang="en-US" smtClean="0"/>
-              <a:t>‹nr.›</a:t>
+              <a:t>‹#›</a:t>
             </a:fld>
             <a:endParaRPr lang="en-US"/>
           </a:p>
@@ -534,7 +534,7 @@
           <a:p>
             <a:fld id="{019186DE-8459-354D-92FA-6DAD5BD2E459}" type="slidenum">
               <a:rPr lang="en-US" smtClean="0"/>
-              <a:t>‹nr.›</a:t>
+              <a:t>‹#›</a:t>
             </a:fld>
             <a:endParaRPr lang="en-US"/>
           </a:p>
@@ -1123,7 +1123,7 @@
             <a:fld id="{6C0001A9-357E-7541-840E-1F18FD9D64CA}" type="slidenum">
               <a:rPr lang="en-US" smtClean="0"/>
               <a:pPr algn="r"/>
-              <a:t>‹nr.›</a:t>
+              <a:t>‹#›</a:t>
             </a:fld>
             <a:endParaRPr lang="en-US" dirty="0"/>
           </a:p>
@@ -1408,7 +1408,7 @@
             <a:fld id="{6C0001A9-357E-7541-840E-1F18FD9D64CA}" type="slidenum">
               <a:rPr lang="en-US" smtClean="0"/>
               <a:pPr algn="r"/>
-              <a:t>‹nr.›</a:t>
+              <a:t>‹#›</a:t>
             </a:fld>
             <a:endParaRPr lang="en-US" dirty="0"/>
           </a:p>
@@ -1731,7 +1731,7 @@
             <a:fld id="{6C0001A9-357E-7541-840E-1F18FD9D64CA}" type="slidenum">
               <a:rPr lang="en-US" smtClean="0"/>
               <a:pPr/>
-              <a:t>‹nr.›</a:t>
+              <a:t>‹#›</a:t>
             </a:fld>
             <a:endParaRPr lang="en-US" dirty="0"/>
           </a:p>
@@ -2070,7 +2070,7 @@
             <a:fld id="{6C0001A9-357E-7541-840E-1F18FD9D64CA}" type="slidenum">
               <a:rPr lang="en-US" smtClean="0"/>
               <a:pPr algn="r"/>
-              <a:t>‹nr.›</a:t>
+              <a:t>‹#›</a:t>
             </a:fld>
             <a:endParaRPr lang="en-US" dirty="0"/>
           </a:p>
@@ -2576,7 +2576,7 @@
             <a:fld id="{6C0001A9-357E-7541-840E-1F18FD9D64CA}" type="slidenum">
               <a:rPr lang="en-US" smtClean="0"/>
               <a:pPr algn="r"/>
-              <a:t>‹nr.›</a:t>
+              <a:t>‹#›</a:t>
             </a:fld>
             <a:endParaRPr lang="en-US" dirty="0"/>
           </a:p>
@@ -2770,7 +2770,7 @@
             <a:fld id="{6C0001A9-357E-7541-840E-1F18FD9D64CA}" type="slidenum">
               <a:rPr lang="en-US" smtClean="0"/>
               <a:pPr algn="r"/>
-              <a:t>‹nr.›</a:t>
+              <a:t>‹#›</a:t>
             </a:fld>
             <a:endParaRPr lang="en-US" dirty="0"/>
           </a:p>
@@ -2964,7 +2964,7 @@
             <a:fld id="{6C0001A9-357E-7541-840E-1F18FD9D64CA}" type="slidenum">
               <a:rPr lang="en-US" smtClean="0"/>
               <a:pPr algn="r"/>
-              <a:t>‹nr.›</a:t>
+              <a:t>‹#›</a:t>
             </a:fld>
             <a:endParaRPr lang="en-US" dirty="0"/>
           </a:p>
@@ -3346,7 +3346,7 @@
             <a:fld id="{6C0001A9-357E-7541-840E-1F18FD9D64CA}" type="slidenum">
               <a:rPr lang="en-US" smtClean="0"/>
               <a:pPr algn="r"/>
-              <a:t>‹nr.›</a:t>
+              <a:t>‹#›</a:t>
             </a:fld>
             <a:endParaRPr lang="en-US" dirty="0"/>
           </a:p>
@@ -3648,7 +3648,7 @@
             <a:fld id="{6C0001A9-357E-7541-840E-1F18FD9D64CA}" type="slidenum">
               <a:rPr lang="en-US" smtClean="0"/>
               <a:pPr algn="r"/>
-              <a:t>‹nr.›</a:t>
+              <a:t>‹#›</a:t>
             </a:fld>
             <a:endParaRPr lang="en-US" dirty="0"/>
           </a:p>
@@ -5210,14 +5210,7 @@
                 <a:latin typeface="Comic Sans MS"/>
                 <a:cs typeface="Comic Sans MS"/>
               </a:rPr>
-              <a:t>Ga vervolgens op </a:t>
-            </a:r>
-            <a:r>
-              <a:rPr lang="nl-NL" dirty="0" smtClean="0">
-                <a:latin typeface="Comic Sans MS"/>
-                <a:cs typeface="Comic Sans MS"/>
-              </a:rPr>
-              <a:t>naar het thema ‘Muziek en dans’ en kies een van de Hip-Hop figuren uit.</a:t>
+              <a:t>Ga vervolgens op naar het thema ‘Muziek en dans’ en kies een van de Hip-Hop figuren uit.</a:t>
             </a:r>
             <a:endParaRPr lang="nl-NL" dirty="0">
               <a:latin typeface="Comic Sans MS"/>
@@ -6712,7 +6705,7 @@
         <p:spPr>
           <a:xfrm>
             <a:off x="411239" y="1709056"/>
-            <a:ext cx="2975428" cy="4524316"/>
+            <a:ext cx="2975428" cy="4247317"/>
           </a:xfrm>
           <a:prstGeom prst="rect">
             <a:avLst/>
@@ -6730,21 +6723,25 @@
                 <a:latin typeface="Comic Sans MS"/>
                 <a:cs typeface="Comic Sans MS"/>
               </a:rPr>
-              <a:t>Bij deze opdracht </a:t>
-            </a:r>
-            <a:r>
-              <a:rPr lang="nl-NL" dirty="0" smtClean="0">
-                <a:latin typeface="Comic Sans MS"/>
-                <a:cs typeface="Comic Sans MS"/>
-              </a:rPr>
-              <a:t>maken we een programma om te kunnen trommelen.</a:t>
-            </a:r>
+              <a:t>Bij deze opdracht maken we een programma om te kunnen trommelen.</a:t>
+            </a:r>
+          </a:p>
+          <a:p>
             <a:endParaRPr lang="nl-NL" dirty="0" smtClean="0">
               <a:latin typeface="Comic Sans MS"/>
               <a:cs typeface="Comic Sans MS"/>
             </a:endParaRPr>
           </a:p>
           <a:p>
+            <a:r>
+              <a:rPr lang="nl-NL" dirty="0" smtClean="0">
+                <a:latin typeface="Comic Sans MS"/>
+                <a:cs typeface="Comic Sans MS"/>
+              </a:rPr>
+              <a:t>Hiervoor moet je het project ‘opdracht_bongo.sb2’ openen.</a:t>
+            </a:r>
+          </a:p>
+          <a:p>
             <a:endParaRPr lang="nl-NL" dirty="0" smtClean="0">
               <a:latin typeface="Comic Sans MS"/>
               <a:cs typeface="Comic Sans MS"/>
@@ -6756,21 +6753,7 @@
                 <a:latin typeface="Comic Sans MS"/>
                 <a:cs typeface="Comic Sans MS"/>
               </a:rPr>
-              <a:t>Hiervoor moet je het project ‘</a:t>
-            </a:r>
-            <a:r>
-              <a:rPr lang="nl-NL" dirty="0" smtClean="0">
-                <a:latin typeface="Comic Sans MS"/>
-                <a:cs typeface="Comic Sans MS"/>
-              </a:rPr>
-              <a:t>opdracht_bongo.sb2</a:t>
-            </a:r>
-            <a:r>
-              <a:rPr lang="nl-NL" dirty="0" smtClean="0">
-                <a:latin typeface="Comic Sans MS"/>
-                <a:cs typeface="Comic Sans MS"/>
-              </a:rPr>
-              <a:t>’ openen.</a:t>
+              <a:t>Dat doe je door in het menu te kiezen voor:</a:t>
             </a:r>
           </a:p>
           <a:p>
@@ -6785,7 +6768,7 @@
                 <a:latin typeface="Comic Sans MS"/>
                 <a:cs typeface="Comic Sans MS"/>
               </a:rPr>
-              <a:t>Dat doe je door in het menu te kiezen voor:</a:t>
+              <a:t>Bestand-&gt;Open</a:t>
             </a:r>
           </a:p>
           <a:p>
@@ -6800,21 +6783,6 @@
                 <a:latin typeface="Comic Sans MS"/>
                 <a:cs typeface="Comic Sans MS"/>
               </a:rPr>
-              <a:t>Bestand-&gt;Open</a:t>
-            </a:r>
-          </a:p>
-          <a:p>
-            <a:endParaRPr lang="nl-NL" dirty="0" smtClean="0">
-              <a:latin typeface="Comic Sans MS"/>
-              <a:cs typeface="Comic Sans MS"/>
-            </a:endParaRPr>
-          </a:p>
-          <a:p>
-            <a:r>
-              <a:rPr lang="nl-NL" dirty="0" smtClean="0">
-                <a:latin typeface="Comic Sans MS"/>
-                <a:cs typeface="Comic Sans MS"/>
-              </a:rPr>
               <a:t>En kies dan </a:t>
             </a:r>
             <a:r>
@@ -6822,7 +6790,7 @@
                 <a:latin typeface="Comic Sans MS"/>
                 <a:cs typeface="Comic Sans MS"/>
               </a:rPr>
-              <a:t>‘opdracht_bongo.sb2</a:t>
+              <a:t>‘Bongo.sb2</a:t>
             </a:r>
             <a:r>
               <a:rPr lang="nl-NL" dirty="0" smtClean="0">
@@ -7004,10 +6972,6 @@
               </a:rPr>
               <a:t>Je ziet een feestzaal met een drum.</a:t>
             </a:r>
-            <a:endParaRPr lang="nl-NL" dirty="0" smtClean="0">
-              <a:latin typeface="Comic Sans MS"/>
-              <a:cs typeface="Comic Sans MS"/>
-            </a:endParaRPr>
           </a:p>
           <a:p>
             <a:endParaRPr lang="nl-NL" dirty="0">
@@ -7021,19 +6985,8 @@
                 <a:latin typeface="Comic Sans MS"/>
                 <a:cs typeface="Comic Sans MS"/>
               </a:rPr>
-              <a:t>Jij moet </a:t>
-            </a:r>
-            <a:r>
-              <a:rPr lang="nl-NL" dirty="0" smtClean="0">
-                <a:latin typeface="Comic Sans MS"/>
-                <a:cs typeface="Comic Sans MS"/>
-              </a:rPr>
-              <a:t>de drum geluid laten maken wanneer je er op slaat.</a:t>
-            </a:r>
-            <a:endParaRPr lang="nl-NL" dirty="0" smtClean="0">
-              <a:latin typeface="Comic Sans MS"/>
-              <a:cs typeface="Comic Sans MS"/>
-            </a:endParaRPr>
+              <a:t>Jij moet de drum geluid laten maken wanneer je er op slaat.</a:t>
+            </a:r>
           </a:p>
           <a:p>
             <a:endParaRPr lang="nl-NL" dirty="0">
@@ -7049,10 +7002,6 @@
               </a:rPr>
               <a:t>Het programma is nu een beetje saai, we gaan het leuker maken door:</a:t>
             </a:r>
-            <a:endParaRPr lang="nl-NL" dirty="0" smtClean="0">
-              <a:latin typeface="Comic Sans MS"/>
-              <a:cs typeface="Comic Sans MS"/>
-            </a:endParaRPr>
           </a:p>
           <a:p>
             <a:endParaRPr lang="nl-NL" dirty="0">
@@ -7072,10 +7021,6 @@
               </a:rPr>
               <a:t>De drum geluid te laten maken als we hem raken.</a:t>
             </a:r>
-            <a:endParaRPr lang="nl-NL" dirty="0" smtClean="0">
-              <a:latin typeface="Comic Sans MS"/>
-              <a:cs typeface="Comic Sans MS"/>
-            </a:endParaRPr>
           </a:p>
           <a:p>
             <a:pPr marL="285750" indent="-285750">
@@ -7089,10 +7034,6 @@
               </a:rPr>
               <a:t>Een danser toe te voegen.</a:t>
             </a:r>
-            <a:endParaRPr lang="nl-NL" dirty="0" smtClean="0">
-              <a:latin typeface="Comic Sans MS"/>
-              <a:cs typeface="Comic Sans MS"/>
-            </a:endParaRPr>
           </a:p>
         </p:txBody>
       </p:sp>
@@ -7264,35 +7205,7 @@
                 <a:latin typeface="Comic Sans MS"/>
                 <a:cs typeface="Comic Sans MS"/>
               </a:rPr>
-              <a:t>Kijk </a:t>
-            </a:r>
-            <a:r>
-              <a:rPr lang="nl-NL" dirty="0" smtClean="0">
-                <a:latin typeface="Comic Sans MS"/>
-                <a:cs typeface="Comic Sans MS"/>
-              </a:rPr>
-              <a:t>wat </a:t>
-            </a:r>
-            <a:r>
-              <a:rPr lang="nl-NL" dirty="0" smtClean="0">
-                <a:latin typeface="Comic Sans MS"/>
-                <a:cs typeface="Comic Sans MS"/>
-              </a:rPr>
-              <a:t>er </a:t>
-            </a:r>
-            <a:r>
-              <a:rPr lang="nl-NL" dirty="0" smtClean="0">
-                <a:latin typeface="Comic Sans MS"/>
-                <a:cs typeface="Comic Sans MS"/>
-              </a:rPr>
-              <a:t>gebeurt </a:t>
-            </a:r>
-            <a:r>
-              <a:rPr lang="nl-NL" dirty="0" smtClean="0">
-                <a:latin typeface="Comic Sans MS"/>
-                <a:cs typeface="Comic Sans MS"/>
-              </a:rPr>
-              <a:t>als je de groene vlag klikt. </a:t>
+              <a:t>Kijk wat er gebeurt als je de groene vlag klikt. </a:t>
             </a:r>
           </a:p>
           <a:p>
@@ -7307,21 +7220,7 @@
                 <a:latin typeface="Comic Sans MS"/>
                 <a:cs typeface="Comic Sans MS"/>
               </a:rPr>
-              <a:t>Wanneer je met je </a:t>
-            </a:r>
-            <a:r>
-              <a:rPr lang="nl-NL" dirty="0" smtClean="0">
-                <a:latin typeface="Comic Sans MS"/>
-                <a:cs typeface="Comic Sans MS"/>
-              </a:rPr>
-              <a:t>handen </a:t>
-            </a:r>
-            <a:r>
-              <a:rPr lang="nl-NL" dirty="0" smtClean="0">
-                <a:latin typeface="Comic Sans MS"/>
-                <a:cs typeface="Comic Sans MS"/>
-              </a:rPr>
-              <a:t>boven de </a:t>
+              <a:t>Wanneer je met je handen boven de </a:t>
             </a:r>
             <a:r>
               <a:rPr lang="nl-NL" dirty="0" err="1" smtClean="0">
@@ -7335,14 +7234,7 @@
                 <a:latin typeface="Comic Sans MS"/>
                 <a:cs typeface="Comic Sans MS"/>
               </a:rPr>
-              <a:t> motion beweegt, </a:t>
-            </a:r>
-            <a:r>
-              <a:rPr lang="nl-NL" dirty="0" smtClean="0">
-                <a:latin typeface="Comic Sans MS"/>
-                <a:cs typeface="Comic Sans MS"/>
-              </a:rPr>
-              <a:t>zullen de groene en rode </a:t>
+              <a:t> motion beweegt, zullen de groene en rode </a:t>
             </a:r>
             <a:r>
               <a:rPr lang="nl-NL" dirty="0" err="1" smtClean="0">
@@ -7356,21 +7248,7 @@
                 <a:latin typeface="Comic Sans MS"/>
                 <a:cs typeface="Comic Sans MS"/>
               </a:rPr>
-              <a:t> </a:t>
-            </a:r>
-            <a:r>
-              <a:rPr lang="nl-NL" dirty="0" smtClean="0">
-                <a:latin typeface="Comic Sans MS"/>
-                <a:cs typeface="Comic Sans MS"/>
-              </a:rPr>
-              <a:t>verschijnen en </a:t>
-            </a:r>
-            <a:r>
-              <a:rPr lang="nl-NL" dirty="0" smtClean="0">
-                <a:latin typeface="Comic Sans MS"/>
-                <a:cs typeface="Comic Sans MS"/>
-              </a:rPr>
-              <a:t>de bewegingen van je handen volgen. </a:t>
+              <a:t> verschijnen en de bewegingen van je handen volgen. </a:t>
             </a:r>
           </a:p>
           <a:p>
@@ -7385,14 +7263,7 @@
                 <a:latin typeface="Comic Sans MS"/>
                 <a:cs typeface="Comic Sans MS"/>
               </a:rPr>
-              <a:t>Als je je handen weghaalt </a:t>
-            </a:r>
-            <a:r>
-              <a:rPr lang="nl-NL" dirty="0" smtClean="0">
-                <a:latin typeface="Comic Sans MS"/>
-                <a:cs typeface="Comic Sans MS"/>
-              </a:rPr>
-              <a:t>verdwijnen de groene en rode </a:t>
+              <a:t>Als je je handen weghaalt verdwijnen de groene en rode </a:t>
             </a:r>
             <a:r>
               <a:rPr lang="nl-NL" dirty="0" err="1" smtClean="0">
@@ -7629,99 +7500,56 @@
               </a:rPr>
               <a:t>Wanneer je een trommel raakt gebeurt er nu nog niks, dat gaan we veranderen!</a:t>
             </a:r>
+          </a:p>
+          <a:p>
+            <a:endParaRPr lang="nl-NL" dirty="0">
+              <a:latin typeface="Comic Sans MS"/>
+              <a:cs typeface="Comic Sans MS"/>
+            </a:endParaRPr>
+          </a:p>
+          <a:p>
+            <a:r>
+              <a:rPr lang="nl-NL" dirty="0" smtClean="0">
+                <a:latin typeface="Comic Sans MS"/>
+                <a:cs typeface="Comic Sans MS"/>
+              </a:rPr>
+              <a:t>Klik op de drum1 in het </a:t>
+            </a:r>
+            <a:r>
+              <a:rPr lang="nl-NL" dirty="0" err="1" smtClean="0">
+                <a:latin typeface="Comic Sans MS"/>
+                <a:cs typeface="Comic Sans MS"/>
+              </a:rPr>
+              <a:t>sprite</a:t>
+            </a:r>
+            <a:r>
+              <a:rPr lang="nl-NL" dirty="0" smtClean="0">
+                <a:latin typeface="Comic Sans MS"/>
+                <a:cs typeface="Comic Sans MS"/>
+              </a:rPr>
+              <a:t> scherm.</a:t>
+            </a:r>
+            <a:endParaRPr lang="nl-NL" dirty="0">
+              <a:latin typeface="Comic Sans MS"/>
+              <a:cs typeface="Comic Sans MS"/>
+            </a:endParaRPr>
+          </a:p>
+          <a:p>
+            <a:r>
+              <a:rPr lang="nl-NL" dirty="0" smtClean="0">
+                <a:latin typeface="Comic Sans MS"/>
+                <a:cs typeface="Comic Sans MS"/>
+              </a:rPr>
+              <a:t>Op het programma scherm zie je nu de bouwstenen van het programma van de drum.</a:t>
+            </a:r>
+          </a:p>
+          <a:p>
             <a:endParaRPr lang="nl-NL" dirty="0" smtClean="0">
               <a:latin typeface="Comic Sans MS"/>
               <a:cs typeface="Comic Sans MS"/>
             </a:endParaRPr>
           </a:p>
           <a:p>
-            <a:endParaRPr lang="nl-NL" dirty="0">
-              <a:latin typeface="Comic Sans MS"/>
-              <a:cs typeface="Comic Sans MS"/>
-            </a:endParaRPr>
-          </a:p>
-          <a:p>
-            <a:r>
-              <a:rPr lang="nl-NL" dirty="0" smtClean="0">
-                <a:latin typeface="Comic Sans MS"/>
-                <a:cs typeface="Comic Sans MS"/>
-              </a:rPr>
-              <a:t>Klik op de </a:t>
-            </a:r>
-            <a:r>
-              <a:rPr lang="nl-NL" dirty="0" smtClean="0">
-                <a:latin typeface="Comic Sans MS"/>
-                <a:cs typeface="Comic Sans MS"/>
-              </a:rPr>
-              <a:t>drum1 </a:t>
-            </a:r>
-            <a:r>
-              <a:rPr lang="nl-NL" dirty="0" smtClean="0">
-                <a:latin typeface="Comic Sans MS"/>
-                <a:cs typeface="Comic Sans MS"/>
-              </a:rPr>
-              <a:t>in het </a:t>
-            </a:r>
-            <a:r>
-              <a:rPr lang="nl-NL" dirty="0" err="1" smtClean="0">
-                <a:latin typeface="Comic Sans MS"/>
-                <a:cs typeface="Comic Sans MS"/>
-              </a:rPr>
-              <a:t>sprite</a:t>
-            </a:r>
-            <a:r>
-              <a:rPr lang="nl-NL" dirty="0" smtClean="0">
-                <a:latin typeface="Comic Sans MS"/>
-                <a:cs typeface="Comic Sans MS"/>
-              </a:rPr>
-              <a:t> scherm.</a:t>
-            </a:r>
-            <a:endParaRPr lang="nl-NL" dirty="0">
-              <a:latin typeface="Comic Sans MS"/>
-              <a:cs typeface="Comic Sans MS"/>
-            </a:endParaRPr>
-          </a:p>
-          <a:p>
-            <a:r>
-              <a:rPr lang="nl-NL" dirty="0" smtClean="0">
-                <a:latin typeface="Comic Sans MS"/>
-                <a:cs typeface="Comic Sans MS"/>
-              </a:rPr>
-              <a:t>Op het programma scherm zie je nu de bouwstenen </a:t>
-            </a:r>
-            <a:r>
-              <a:rPr lang="nl-NL" dirty="0" smtClean="0">
-                <a:latin typeface="Comic Sans MS"/>
-                <a:cs typeface="Comic Sans MS"/>
-              </a:rPr>
-              <a:t>van het programma van </a:t>
-            </a:r>
-            <a:r>
-              <a:rPr lang="nl-NL" dirty="0" smtClean="0">
-                <a:latin typeface="Comic Sans MS"/>
-                <a:cs typeface="Comic Sans MS"/>
-              </a:rPr>
-              <a:t>de </a:t>
-            </a:r>
-            <a:r>
-              <a:rPr lang="nl-NL" dirty="0" smtClean="0">
-                <a:latin typeface="Comic Sans MS"/>
-                <a:cs typeface="Comic Sans MS"/>
-              </a:rPr>
-              <a:t>drum.</a:t>
-            </a:r>
-            <a:endParaRPr lang="nl-NL" dirty="0" smtClean="0">
-              <a:latin typeface="Comic Sans MS"/>
-              <a:cs typeface="Comic Sans MS"/>
-            </a:endParaRPr>
-          </a:p>
-          <a:p>
-            <a:endParaRPr lang="nl-NL" dirty="0" smtClean="0">
-              <a:latin typeface="Comic Sans MS"/>
-              <a:cs typeface="Comic Sans MS"/>
-            </a:endParaRPr>
-          </a:p>
-          <a:p>
             <a:r>
               <a:rPr lang="nl-NL" dirty="0" smtClean="0">
                 <a:latin typeface="Comic Sans MS"/>
@@ -7729,10 +7557,6 @@
               </a:rPr>
               <a:t>Nu zie je alleen het startblok staan, we gaan de blokken toevoegen om de acties uit te kunnen voeren als je met je hand de drum raakt.</a:t>
             </a:r>
-            <a:endParaRPr lang="nl-NL" dirty="0" smtClean="0">
-              <a:latin typeface="Comic Sans MS"/>
-              <a:cs typeface="Comic Sans MS"/>
-            </a:endParaRPr>
           </a:p>
         </p:txBody>
       </p:sp>
@@ -9378,19 +9202,8 @@
                 <a:latin typeface="Comic Sans MS"/>
                 <a:cs typeface="Comic Sans MS"/>
               </a:rPr>
-              <a:t>We willen dat de drum maar een keer geluid maakt als we hem raken. </a:t>
-            </a:r>
-            <a:r>
-              <a:rPr lang="nl-NL" dirty="0" smtClean="0">
-                <a:latin typeface="Comic Sans MS"/>
-                <a:cs typeface="Comic Sans MS"/>
-              </a:rPr>
-              <a:t>We doen dit door te wachten tot geen van beide handen de drum nog raakt voordat we weer opnieuw gaan kijken of de drum geraakt wordt.</a:t>
-            </a:r>
-            <a:endParaRPr lang="nl-NL" dirty="0" smtClean="0">
-              <a:latin typeface="Comic Sans MS"/>
-              <a:cs typeface="Comic Sans MS"/>
-            </a:endParaRPr>
+              <a:t>We willen dat de drum maar een keer geluid maakt als we hem raken. We doen dit door te wachten tot geen van beide handen de drum nog raakt voordat we weer opnieuw gaan kijken of de drum geraakt wordt.</a:t>
+            </a:r>
           </a:p>
           <a:p>
             <a:endParaRPr lang="nl-NL" dirty="0" smtClean="0">

</xml_diff>